<commit_message>
async and await ppt updated
</commit_message>
<xml_diff>
--- a/Async and Await.pptx
+++ b/Async and Await.pptx
@@ -7126,7 +7126,7 @@
             </a:pPr>
             <a:r>
               <a:rPr lang="en-US" dirty="0"/>
-              <a:t>Concise and clean</a:t>
+              <a:t>Concise and clean : we don’t have to write resolve and reject.</a:t>
             </a:r>
           </a:p>
           <a:p>
@@ -7136,7 +7136,7 @@
             </a:pPr>
             <a:r>
               <a:rPr lang="en-US" dirty="0"/>
-              <a:t>Error handling</a:t>
+              <a:t>Error handling : we can use try/catch </a:t>
             </a:r>
           </a:p>
           <a:p>
@@ -7146,7 +7146,7 @@
             </a:pPr>
             <a:r>
               <a:rPr lang="en-US" dirty="0"/>
-              <a:t>Conditionals</a:t>
+              <a:t>Conditionals : it makes condition easier</a:t>
             </a:r>
           </a:p>
           <a:p>
@@ -7156,7 +7156,7 @@
             </a:pPr>
             <a:r>
               <a:rPr lang="en-US" dirty="0"/>
-              <a:t>Debugging</a:t>
+              <a:t>Debugging : much easier to debug</a:t>
             </a:r>
           </a:p>
           <a:p>
@@ -7169,13 +7169,14 @@
               <a:t>You can </a:t>
             </a:r>
             <a:r>
-              <a:rPr lang="en-US" b="1" dirty="0"/>
+              <a:rPr lang="en-US" b="1"/>
               <a:t>await</a:t>
             </a:r>
             <a:r>
-              <a:rPr lang="en-US" dirty="0"/>
-              <a:t> anything</a:t>
-            </a:r>
+              <a:rPr lang="en-US"/>
+              <a:t> anything </a:t>
+            </a:r>
+            <a:endParaRPr lang="en-US" dirty="0"/>
           </a:p>
         </p:txBody>
       </p:sp>

</xml_diff>